<commit_message>
arrumei o slide 7 do ppt
</commit_message>
<xml_diff>
--- a/documentação/ApresentaçãoLuminous.pptx
+++ b/documentação/ApresentaçãoLuminous.pptx
@@ -12614,33 +12614,15 @@
                                   </p:childTnLst>
                                 </p:cTn>
                               </p:par>
-                            </p:childTnLst>
-                          </p:cTn>
-                        </p:par>
-                      </p:childTnLst>
-                    </p:cTn>
-                  </p:par>
-                  <p:par>
-                    <p:cTn id="17" fill="hold">
-                      <p:stCondLst>
-                        <p:cond delay="indefinite"/>
-                      </p:stCondLst>
-                      <p:childTnLst>
-                        <p:par>
-                          <p:cTn id="18" fill="hold">
-                            <p:stCondLst>
-                              <p:cond delay="0"/>
-                            </p:stCondLst>
-                            <p:childTnLst>
                               <p:par>
-                                <p:cTn id="19" presetID="10" presetClass="entr" presetSubtype="0" fill="hold" nodeType="clickEffect">
+                                <p:cTn id="17" presetID="10" presetClass="entr" presetSubtype="0" fill="hold" nodeType="withEffect">
                                   <p:stCondLst>
                                     <p:cond delay="0"/>
                                   </p:stCondLst>
                                   <p:childTnLst>
                                     <p:set>
                                       <p:cBhvr>
-                                        <p:cTn id="20" dur="1" fill="hold">
+                                        <p:cTn id="18" dur="1" fill="hold">
                                           <p:stCondLst>
                                             <p:cond delay="0"/>
                                           </p:stCondLst>
@@ -12658,7 +12640,7 @@
                                     </p:set>
                                     <p:animEffect transition="in" filter="fade">
                                       <p:cBhvr>
-                                        <p:cTn id="21" dur="1000"/>
+                                        <p:cTn id="19" dur="1000"/>
                                         <p:tgtEl>
                                           <p:spTgt spid="8"/>
                                         </p:tgtEl>

</xml_diff>